<commit_message>
Debug inconsistency between new and legacy version Progress presentation
</commit_message>
<xml_diff>
--- a/notes/Presentation Feb2017/StochasticThreshold.pptx
+++ b/notes/Presentation Feb2017/StochasticThreshold.pptx
@@ -20,8 +20,10 @@
     <p:sldId id="266" r:id="rId14"/>
     <p:sldId id="269" r:id="rId15"/>
     <p:sldId id="270" r:id="rId16"/>
-    <p:sldId id="271" r:id="rId17"/>
-    <p:sldId id="272" r:id="rId18"/>
+    <p:sldId id="274" r:id="rId17"/>
+    <p:sldId id="273" r:id="rId18"/>
+    <p:sldId id="272" r:id="rId19"/>
+    <p:sldId id="275" r:id="rId20"/>
   </p:sldIdLst>
   <p:sldSz cx="12192000" cy="6858000"/>
   <p:notesSz cx="6858000" cy="9144000"/>
@@ -120,6 +122,11 @@
       </a:defRPr>
     </a:lvl9pPr>
   </p:defaultTextStyle>
+  <p:extLst>
+    <p:ext uri="{EFAFB233-063F-42B5-8137-9DF3F51BA10A}">
+      <p15:sldGuideLst xmlns:p15="http://schemas.microsoft.com/office/powerpoint/2012/main"/>
+    </p:ext>
+  </p:extLst>
 </p:presentation>
 </file>
 
@@ -254,7 +261,7 @@
           <a:p>
             <a:fld id="{3740764F-BF5E-4ADA-8628-0FD9693D1FF7}" type="datetimeFigureOut">
               <a:rPr lang="en-GB" smtClean="0"/>
-              <a:t>21/02/2017</a:t>
+              <a:t>23/02/2017</a:t>
             </a:fld>
             <a:endParaRPr lang="en-GB"/>
           </a:p>
@@ -424,7 +431,7 @@
           <a:p>
             <a:fld id="{3740764F-BF5E-4ADA-8628-0FD9693D1FF7}" type="datetimeFigureOut">
               <a:rPr lang="en-GB" smtClean="0"/>
-              <a:t>21/02/2017</a:t>
+              <a:t>23/02/2017</a:t>
             </a:fld>
             <a:endParaRPr lang="en-GB"/>
           </a:p>
@@ -604,7 +611,7 @@
           <a:p>
             <a:fld id="{3740764F-BF5E-4ADA-8628-0FD9693D1FF7}" type="datetimeFigureOut">
               <a:rPr lang="en-GB" smtClean="0"/>
-              <a:t>21/02/2017</a:t>
+              <a:t>23/02/2017</a:t>
             </a:fld>
             <a:endParaRPr lang="en-GB"/>
           </a:p>
@@ -774,7 +781,7 @@
           <a:p>
             <a:fld id="{3740764F-BF5E-4ADA-8628-0FD9693D1FF7}" type="datetimeFigureOut">
               <a:rPr lang="en-GB" smtClean="0"/>
-              <a:t>21/02/2017</a:t>
+              <a:t>23/02/2017</a:t>
             </a:fld>
             <a:endParaRPr lang="en-GB"/>
           </a:p>
@@ -1020,7 +1027,7 @@
           <a:p>
             <a:fld id="{3740764F-BF5E-4ADA-8628-0FD9693D1FF7}" type="datetimeFigureOut">
               <a:rPr lang="en-GB" smtClean="0"/>
-              <a:t>21/02/2017</a:t>
+              <a:t>23/02/2017</a:t>
             </a:fld>
             <a:endParaRPr lang="en-GB"/>
           </a:p>
@@ -1252,7 +1259,7 @@
           <a:p>
             <a:fld id="{3740764F-BF5E-4ADA-8628-0FD9693D1FF7}" type="datetimeFigureOut">
               <a:rPr lang="en-GB" smtClean="0"/>
-              <a:t>21/02/2017</a:t>
+              <a:t>23/02/2017</a:t>
             </a:fld>
             <a:endParaRPr lang="en-GB"/>
           </a:p>
@@ -1619,7 +1626,7 @@
           <a:p>
             <a:fld id="{3740764F-BF5E-4ADA-8628-0FD9693D1FF7}" type="datetimeFigureOut">
               <a:rPr lang="en-GB" smtClean="0"/>
-              <a:t>21/02/2017</a:t>
+              <a:t>23/02/2017</a:t>
             </a:fld>
             <a:endParaRPr lang="en-GB"/>
           </a:p>
@@ -1737,7 +1744,7 @@
           <a:p>
             <a:fld id="{3740764F-BF5E-4ADA-8628-0FD9693D1FF7}" type="datetimeFigureOut">
               <a:rPr lang="en-GB" smtClean="0"/>
-              <a:t>21/02/2017</a:t>
+              <a:t>23/02/2017</a:t>
             </a:fld>
             <a:endParaRPr lang="en-GB"/>
           </a:p>
@@ -1832,7 +1839,7 @@
           <a:p>
             <a:fld id="{3740764F-BF5E-4ADA-8628-0FD9693D1FF7}" type="datetimeFigureOut">
               <a:rPr lang="en-GB" smtClean="0"/>
-              <a:t>21/02/2017</a:t>
+              <a:t>23/02/2017</a:t>
             </a:fld>
             <a:endParaRPr lang="en-GB"/>
           </a:p>
@@ -2109,7 +2116,7 @@
           <a:p>
             <a:fld id="{3740764F-BF5E-4ADA-8628-0FD9693D1FF7}" type="datetimeFigureOut">
               <a:rPr lang="en-GB" smtClean="0"/>
-              <a:t>21/02/2017</a:t>
+              <a:t>23/02/2017</a:t>
             </a:fld>
             <a:endParaRPr lang="en-GB"/>
           </a:p>
@@ -2362,7 +2369,7 @@
           <a:p>
             <a:fld id="{3740764F-BF5E-4ADA-8628-0FD9693D1FF7}" type="datetimeFigureOut">
               <a:rPr lang="en-GB" smtClean="0"/>
-              <a:t>21/02/2017</a:t>
+              <a:t>23/02/2017</a:t>
             </a:fld>
             <a:endParaRPr lang="en-GB"/>
           </a:p>
@@ -2575,7 +2582,7 @@
           <a:p>
             <a:fld id="{3740764F-BF5E-4ADA-8628-0FD9693D1FF7}" type="datetimeFigureOut">
               <a:rPr lang="en-GB" smtClean="0"/>
-              <a:t>21/02/2017</a:t>
+              <a:t>23/02/2017</a:t>
             </a:fld>
             <a:endParaRPr lang="en-GB"/>
           </a:p>
@@ -3530,8 +3537,8 @@
         </p:nvSpPr>
         <p:spPr>
           <a:xfrm>
-            <a:off x="838200" y="1690688"/>
-            <a:ext cx="7764370" cy="369332"/>
+            <a:off x="838200" y="1496650"/>
+            <a:ext cx="10719601" cy="369332"/>
           </a:xfrm>
           <a:prstGeom prst="rect">
             <a:avLst/>
@@ -3546,7 +3553,7 @@
           <a:p>
             <a:r>
               <a:rPr lang="en-GB" dirty="0"/>
-              <a:t>The noise is so strong that it would have triggered micro-saccades on the fixation</a:t>
+              <a:t>The noise is so strong that it would have triggered micro-saccades on the fixation way before target presentation</a:t>
             </a:r>
           </a:p>
         </p:txBody>
@@ -3561,6 +3568,13 @@
         </p:nvPicPr>
         <p:blipFill>
           <a:blip r:embed="rId2">
+            <a:duotone>
+              <a:prstClr val="black"/>
+              <a:schemeClr val="accent3">
+                <a:tint val="45000"/>
+                <a:satMod val="400000"/>
+              </a:schemeClr>
+            </a:duotone>
             <a:extLst>
               <a:ext uri="{28A0092B-C50C-407E-A947-70E740481C1C}">
                 <a14:useLocalDpi xmlns:a14="http://schemas.microsoft.com/office/drawing/2010/main" val="0"/>
@@ -4000,6 +4014,64 @@
           <a:p>
             <a:pPr algn="ctr"/>
             <a:endParaRPr lang="en-GB"/>
+          </a:p>
+        </p:txBody>
+      </p:sp>
+      <p:sp>
+        <p:nvSpPr>
+          <p:cNvPr id="17" name="TextBox 16"/>
+          <p:cNvSpPr txBox="1"/>
+          <p:nvPr/>
+        </p:nvSpPr>
+        <p:spPr>
+          <a:xfrm rot="5400000">
+            <a:off x="10807435" y="3385583"/>
+            <a:ext cx="1500732" cy="369332"/>
+          </a:xfrm>
+          <a:prstGeom prst="rect">
+            <a:avLst/>
+          </a:prstGeom>
+          <a:noFill/>
+        </p:spPr>
+        <p:txBody>
+          <a:bodyPr wrap="none" rtlCol="0">
+            <a:spAutoFit/>
+          </a:bodyPr>
+          <a:lstStyle/>
+          <a:p>
+            <a:r>
+              <a:rPr lang="en-GB" dirty="0"/>
+              <a:t>Space (nodes)</a:t>
+            </a:r>
+          </a:p>
+        </p:txBody>
+      </p:sp>
+      <p:sp>
+        <p:nvSpPr>
+          <p:cNvPr id="4" name="TextBox 3"/>
+          <p:cNvSpPr txBox="1"/>
+          <p:nvPr/>
+        </p:nvSpPr>
+        <p:spPr>
+          <a:xfrm>
+            <a:off x="4536006" y="2055870"/>
+            <a:ext cx="3323987" cy="369332"/>
+          </a:xfrm>
+          <a:prstGeom prst="rect">
+            <a:avLst/>
+          </a:prstGeom>
+          <a:noFill/>
+        </p:spPr>
+        <p:txBody>
+          <a:bodyPr wrap="none" rtlCol="0">
+            <a:spAutoFit/>
+          </a:bodyPr>
+          <a:lstStyle/>
+          <a:p>
+            <a:r>
+              <a:rPr lang="en-GB" dirty="0"/>
+              <a:t>One trial simulation of DINASAUR</a:t>
+            </a:r>
           </a:p>
         </p:txBody>
       </p:sp>
@@ -4639,8 +4711,12 @@
           </a:p>
           <a:p>
             <a:r>
-              <a:rPr lang="en-GB" dirty="0"/>
-              <a:t>Micro saccades are not different from Macro saccades. </a:t>
+              <a:rPr lang="en-GB" b="1" dirty="0">
+                <a:solidFill>
+                  <a:schemeClr val="accent1"/>
+                </a:solidFill>
+              </a:rPr>
+              <a:t>Micro saccades are not different from Macro saccades </a:t>
             </a:r>
           </a:p>
           <a:p>
@@ -4679,7 +4755,11 @@
           </a:p>
           <a:p>
             <a:r>
-              <a:rPr lang="en-GB" dirty="0"/>
+              <a:rPr lang="en-GB" b="1" dirty="0">
+                <a:solidFill>
+                  <a:schemeClr val="accent1"/>
+                </a:solidFill>
+              </a:rPr>
               <a:t>Micro saccades are not different from Macro saccades</a:t>
             </a:r>
           </a:p>
@@ -4752,7 +4832,7 @@
         <p:spPr>
           <a:xfrm>
             <a:off x="1016516" y="1619927"/>
-            <a:ext cx="5223802" cy="1754326"/>
+            <a:ext cx="6555769" cy="369332"/>
           </a:xfrm>
           <a:prstGeom prst="rect">
             <a:avLst/>
@@ -4767,18 +4847,101 @@
           <a:p>
             <a:r>
               <a:rPr lang="en-GB" dirty="0"/>
-              <a:t>So why ignoring small saccades?</a:t>
-            </a:r>
-          </a:p>
-          <a:p>
-            <a:endParaRPr lang="en-GB" dirty="0"/>
-          </a:p>
-          <a:p>
-            <a:r>
-              <a:rPr lang="en-GB" dirty="0"/>
-              <a:t>In DINASAUR, small saccades were:</a:t>
-            </a:r>
-          </a:p>
+              <a:t>So why ignoring small saccades? In DINASAUR, small saccades were:</a:t>
+            </a:r>
+          </a:p>
+        </p:txBody>
+      </p:sp>
+      <p:pic>
+        <p:nvPicPr>
+          <p:cNvPr id="4" name="Picture 3"/>
+          <p:cNvPicPr>
+            <a:picLocks noChangeAspect="1"/>
+          </p:cNvPicPr>
+          <p:nvPr/>
+        </p:nvPicPr>
+        <p:blipFill rotWithShape="1">
+          <a:blip r:embed="rId2"/>
+          <a:srcRect r="76166"/>
+          <a:stretch/>
+        </p:blipFill>
+        <p:spPr>
+          <a:xfrm>
+            <a:off x="2785564" y="4475211"/>
+            <a:ext cx="1642180" cy="1545340"/>
+          </a:xfrm>
+          <a:prstGeom prst="rect">
+            <a:avLst/>
+          </a:prstGeom>
+        </p:spPr>
+      </p:pic>
+      <p:pic>
+        <p:nvPicPr>
+          <p:cNvPr id="6" name="Picture 5"/>
+          <p:cNvPicPr>
+            <a:picLocks noChangeAspect="1"/>
+          </p:cNvPicPr>
+          <p:nvPr/>
+        </p:nvPicPr>
+        <p:blipFill rotWithShape="1">
+          <a:blip r:embed="rId2"/>
+          <a:srcRect l="46173" t="1079" r="29993" b="-1079"/>
+          <a:stretch/>
+        </p:blipFill>
+        <p:spPr>
+          <a:xfrm>
+            <a:off x="4756993" y="2466964"/>
+            <a:ext cx="1767631" cy="1663393"/>
+          </a:xfrm>
+          <a:prstGeom prst="rect">
+            <a:avLst/>
+          </a:prstGeom>
+        </p:spPr>
+      </p:pic>
+      <p:pic>
+        <p:nvPicPr>
+          <p:cNvPr id="3" name="Picture 2"/>
+          <p:cNvPicPr>
+            <a:picLocks noChangeAspect="1"/>
+          </p:cNvPicPr>
+          <p:nvPr/>
+        </p:nvPicPr>
+        <p:blipFill>
+          <a:blip r:embed="rId3"/>
+          <a:stretch>
+            <a:fillRect/>
+          </a:stretch>
+        </p:blipFill>
+        <p:spPr>
+          <a:xfrm>
+            <a:off x="2711124" y="2502346"/>
+            <a:ext cx="1919001" cy="1620026"/>
+          </a:xfrm>
+          <a:prstGeom prst="rect">
+            <a:avLst/>
+          </a:prstGeom>
+        </p:spPr>
+      </p:pic>
+      <p:sp>
+        <p:nvSpPr>
+          <p:cNvPr id="8" name="Rectangle 7"/>
+          <p:cNvSpPr/>
+          <p:nvPr/>
+        </p:nvSpPr>
+        <p:spPr>
+          <a:xfrm>
+            <a:off x="2447917" y="2172891"/>
+            <a:ext cx="6096000" cy="4247317"/>
+          </a:xfrm>
+          <a:prstGeom prst="rect">
+            <a:avLst/>
+          </a:prstGeom>
+        </p:spPr>
+        <p:txBody>
+          <a:bodyPr>
+            <a:spAutoFit/>
+          </a:bodyPr>
+          <a:lstStyle/>
           <a:p>
             <a:pPr marL="285750" indent="-285750">
               <a:buFontTx/>
@@ -4786,7 +4949,7 @@
             </a:pPr>
             <a:r>
               <a:rPr lang="en-GB" dirty="0"/>
-              <a:t>Too many</a:t>
+              <a:t>Not well distributed in time (Too many)</a:t>
             </a:r>
           </a:p>
           <a:p>
@@ -4794,19 +4957,103 @@
               <a:buFontTx/>
               <a:buChar char="-"/>
             </a:pPr>
-            <a:r>
-              <a:rPr lang="en-GB" dirty="0"/>
-              <a:t>Not small enough</a:t>
-            </a:r>
+            <a:endParaRPr lang="en-GB" dirty="0"/>
           </a:p>
           <a:p>
             <a:pPr marL="285750" indent="-285750">
               <a:buFontTx/>
               <a:buChar char="-"/>
             </a:pPr>
+            <a:endParaRPr lang="en-GB" dirty="0"/>
+          </a:p>
+          <a:p>
+            <a:pPr marL="285750" indent="-285750">
+              <a:buFontTx/>
+              <a:buChar char="-"/>
+            </a:pPr>
+            <a:endParaRPr lang="en-GB" dirty="0"/>
+          </a:p>
+          <a:p>
+            <a:pPr marL="285750" indent="-285750">
+              <a:buFontTx/>
+              <a:buChar char="-"/>
+            </a:pPr>
+            <a:endParaRPr lang="en-GB" dirty="0"/>
+          </a:p>
+          <a:p>
+            <a:pPr marL="285750" indent="-285750">
+              <a:buFontTx/>
+              <a:buChar char="-"/>
+            </a:pPr>
+            <a:endParaRPr lang="en-GB" dirty="0"/>
+          </a:p>
+          <a:p>
+            <a:pPr marL="285750" indent="-285750">
+              <a:buFontTx/>
+              <a:buChar char="-"/>
+            </a:pPr>
+            <a:endParaRPr lang="en-GB" dirty="0"/>
+          </a:p>
+          <a:p>
+            <a:pPr marL="285750" indent="-285750">
+              <a:buFontTx/>
+              <a:buChar char="-"/>
+            </a:pPr>
             <a:r>
               <a:rPr lang="en-GB" dirty="0"/>
-              <a:t>The only saccade generated (one saccade per trial)</a:t>
+              <a:t>Not well distributed in space? (centred on zero)</a:t>
+            </a:r>
+          </a:p>
+          <a:p>
+            <a:pPr marL="285750" indent="-285750">
+              <a:buFontTx/>
+              <a:buChar char="-"/>
+            </a:pPr>
+            <a:endParaRPr lang="en-GB" dirty="0"/>
+          </a:p>
+          <a:p>
+            <a:pPr marL="285750" indent="-285750">
+              <a:buFontTx/>
+              <a:buChar char="-"/>
+            </a:pPr>
+            <a:endParaRPr lang="en-GB" dirty="0"/>
+          </a:p>
+          <a:p>
+            <a:pPr marL="285750" indent="-285750">
+              <a:buFontTx/>
+              <a:buChar char="-"/>
+            </a:pPr>
+            <a:endParaRPr lang="en-GB" dirty="0"/>
+          </a:p>
+          <a:p>
+            <a:pPr marL="285750" indent="-285750">
+              <a:buFontTx/>
+              <a:buChar char="-"/>
+            </a:pPr>
+            <a:endParaRPr lang="en-GB" dirty="0"/>
+          </a:p>
+          <a:p>
+            <a:pPr marL="285750" indent="-285750">
+              <a:buFontTx/>
+              <a:buChar char="-"/>
+            </a:pPr>
+            <a:endParaRPr lang="en-GB" dirty="0"/>
+          </a:p>
+          <a:p>
+            <a:pPr marL="285750" indent="-285750">
+              <a:buFontTx/>
+              <a:buChar char="-"/>
+            </a:pPr>
+            <a:endParaRPr lang="en-GB" dirty="0"/>
+          </a:p>
+          <a:p>
+            <a:pPr marL="285750" indent="-285750">
+              <a:buFontTx/>
+              <a:buChar char="-"/>
+            </a:pPr>
+            <a:r>
+              <a:rPr lang="en-GB" dirty="0"/>
+              <a:t>Messing up the trials (accounting for one saccade per trial)</a:t>
             </a:r>
           </a:p>
         </p:txBody>
@@ -4871,8 +5118,8 @@
         </p:nvSpPr>
         <p:spPr>
           <a:xfrm>
-            <a:off x="738018" y="1443546"/>
-            <a:ext cx="5223802" cy="1200329"/>
+            <a:off x="738018" y="1653096"/>
+            <a:ext cx="3127075" cy="369332"/>
           </a:xfrm>
           <a:prstGeom prst="rect">
             <a:avLst/>
@@ -4884,12 +5131,6 @@
             <a:spAutoFit/>
           </a:bodyPr>
           <a:lstStyle/>
-          <a:p>
-            <a:r>
-              <a:rPr lang="en-GB" dirty="0"/>
-              <a:t>In DINASAUR, small saccades were:</a:t>
-            </a:r>
-          </a:p>
           <a:p>
             <a:pPr marL="285750" indent="-285750">
               <a:buFontTx/>
@@ -4901,31 +5142,7 @@
                   <a:schemeClr val="accent1"/>
                 </a:solidFill>
               </a:rPr>
-              <a:t>Too many</a:t>
-            </a:r>
-          </a:p>
-          <a:p>
-            <a:pPr marL="285750" indent="-285750">
-              <a:buFontTx/>
-              <a:buChar char="-"/>
-            </a:pPr>
-            <a:r>
-              <a:rPr lang="en-GB" dirty="0">
-                <a:solidFill>
-                  <a:schemeClr val="accent1"/>
-                </a:solidFill>
-              </a:rPr>
-              <a:t>Not small enough</a:t>
-            </a:r>
-          </a:p>
-          <a:p>
-            <a:pPr marL="285750" indent="-285750">
-              <a:buFontTx/>
-              <a:buChar char="-"/>
-            </a:pPr>
-            <a:r>
-              <a:rPr lang="en-GB" dirty="0"/>
-              <a:t>The only saccade generated (one saccade per trial)</a:t>
+              <a:t>not well distributed in space</a:t>
             </a:r>
           </a:p>
         </p:txBody>
@@ -5102,7 +5319,7 @@
       </p:sp>
       <p:pic>
         <p:nvPicPr>
-          <p:cNvPr id="6" name="Picture 5"/>
+          <p:cNvPr id="9" name="Picture 8"/>
           <p:cNvPicPr>
             <a:picLocks noChangeAspect="1"/>
           </p:cNvPicPr>
@@ -5122,7 +5339,7 @@
         </p:blipFill>
         <p:spPr>
           <a:xfrm>
-            <a:off x="2407152" y="4512559"/>
+            <a:off x="2407152" y="2021148"/>
             <a:ext cx="5581225" cy="1938096"/>
           </a:xfrm>
           <a:prstGeom prst="rect">
@@ -5130,9 +5347,130 @@
           </a:prstGeom>
         </p:spPr>
       </p:pic>
+      <p:sp>
+        <p:nvSpPr>
+          <p:cNvPr id="10" name="TextBox 9"/>
+          <p:cNvSpPr txBox="1"/>
+          <p:nvPr/>
+        </p:nvSpPr>
+        <p:spPr>
+          <a:xfrm>
+            <a:off x="4206370" y="1643795"/>
+            <a:ext cx="1982787" cy="369332"/>
+          </a:xfrm>
+          <a:prstGeom prst="rect">
+            <a:avLst/>
+          </a:prstGeom>
+          <a:noFill/>
+        </p:spPr>
+        <p:txBody>
+          <a:bodyPr wrap="none" rtlCol="0">
+            <a:spAutoFit/>
+          </a:bodyPr>
+          <a:lstStyle/>
+          <a:p>
+            <a:r>
+              <a:rPr lang="en-GB" dirty="0"/>
+              <a:t>Noise in DINASAUR</a:t>
+            </a:r>
+          </a:p>
+        </p:txBody>
+      </p:sp>
+      <p:sp>
+        <p:nvSpPr>
+          <p:cNvPr id="14" name="TextBox 13"/>
+          <p:cNvSpPr txBox="1"/>
+          <p:nvPr/>
+        </p:nvSpPr>
+        <p:spPr>
+          <a:xfrm>
+            <a:off x="785643" y="1409317"/>
+            <a:ext cx="2856167" cy="369332"/>
+          </a:xfrm>
+          <a:prstGeom prst="rect">
+            <a:avLst/>
+          </a:prstGeom>
+          <a:noFill/>
+        </p:spPr>
+        <p:txBody>
+          <a:bodyPr wrap="none" rtlCol="0">
+            <a:spAutoFit/>
+          </a:bodyPr>
+          <a:lstStyle/>
+          <a:p>
+            <a:r>
+              <a:rPr lang="en-GB" dirty="0">
+                <a:solidFill>
+                  <a:schemeClr val="accent1"/>
+                </a:solidFill>
+              </a:rPr>
+              <a:t>- not well distributed in time</a:t>
+            </a:r>
+          </a:p>
+        </p:txBody>
+      </p:sp>
+      <p:sp>
+        <p:nvSpPr>
+          <p:cNvPr id="15" name="TextBox 14"/>
+          <p:cNvSpPr txBox="1"/>
+          <p:nvPr/>
+        </p:nvSpPr>
+        <p:spPr>
+          <a:xfrm>
+            <a:off x="8367713" y="2105025"/>
+            <a:ext cx="3371850" cy="3416320"/>
+          </a:xfrm>
+          <a:prstGeom prst="rect">
+            <a:avLst/>
+          </a:prstGeom>
+          <a:noFill/>
+        </p:spPr>
+        <p:txBody>
+          <a:bodyPr wrap="square" rtlCol="0">
+            <a:spAutoFit/>
+          </a:bodyPr>
+          <a:lstStyle/>
+          <a:p>
+            <a:endParaRPr lang="en-GB" dirty="0"/>
+          </a:p>
+          <a:p>
+            <a:r>
+              <a:rPr lang="en-GB" dirty="0"/>
+              <a:t>- Difficult to control of the probability to trigger a saccade</a:t>
+            </a:r>
+          </a:p>
+          <a:p>
+            <a:endParaRPr lang="en-GB" dirty="0"/>
+          </a:p>
+          <a:p>
+            <a:endParaRPr lang="en-GB" dirty="0"/>
+          </a:p>
+          <a:p>
+            <a:endParaRPr lang="en-GB" dirty="0"/>
+          </a:p>
+          <a:p>
+            <a:endParaRPr lang="en-GB" dirty="0"/>
+          </a:p>
+          <a:p>
+            <a:endParaRPr lang="en-GB" dirty="0"/>
+          </a:p>
+          <a:p>
+            <a:endParaRPr lang="en-GB" dirty="0"/>
+          </a:p>
+          <a:p>
+            <a:r>
+              <a:rPr lang="en-GB" dirty="0"/>
+              <a:t>- Noise interacts with the mutual excitation/inhibition interactions</a:t>
+            </a:r>
+          </a:p>
+          <a:p>
+            <a:endParaRPr lang="en-GB" dirty="0"/>
+          </a:p>
+        </p:txBody>
+      </p:sp>
       <p:pic>
         <p:nvPicPr>
-          <p:cNvPr id="9" name="Picture 8"/>
+          <p:cNvPr id="3" name="Picture 2"/>
           <p:cNvPicPr>
             <a:picLocks noChangeAspect="1"/>
           </p:cNvPicPr>
@@ -5152,164 +5490,18 @@
         </p:blipFill>
         <p:spPr>
           <a:xfrm>
-            <a:off x="2407152" y="2021148"/>
-            <a:ext cx="5581225" cy="1938096"/>
+            <a:off x="2392638" y="4241386"/>
+            <a:ext cx="5874856" cy="1833957"/>
           </a:xfrm>
           <a:prstGeom prst="rect">
             <a:avLst/>
           </a:prstGeom>
         </p:spPr>
       </p:pic>
-      <p:sp>
-        <p:nvSpPr>
-          <p:cNvPr id="10" name="TextBox 9"/>
-          <p:cNvSpPr txBox="1"/>
-          <p:nvPr/>
-        </p:nvSpPr>
-        <p:spPr>
-          <a:xfrm>
-            <a:off x="4206370" y="1643795"/>
-            <a:ext cx="1982787" cy="369332"/>
-          </a:xfrm>
-          <a:prstGeom prst="rect">
-            <a:avLst/>
-          </a:prstGeom>
-          <a:noFill/>
-        </p:spPr>
-        <p:txBody>
-          <a:bodyPr wrap="none" rtlCol="0">
-            <a:spAutoFit/>
-          </a:bodyPr>
-          <a:lstStyle/>
-          <a:p>
-            <a:r>
-              <a:rPr lang="en-GB" dirty="0"/>
-              <a:t>Noise in DINASAUR</a:t>
-            </a:r>
-          </a:p>
-        </p:txBody>
-      </p:sp>
-      <p:sp>
-        <p:nvSpPr>
-          <p:cNvPr id="11" name="TextBox 10"/>
-          <p:cNvSpPr txBox="1"/>
-          <p:nvPr/>
-        </p:nvSpPr>
-        <p:spPr>
-          <a:xfrm>
-            <a:off x="4244470" y="4143227"/>
-            <a:ext cx="2119683" cy="369332"/>
-          </a:xfrm>
-          <a:prstGeom prst="rect">
-            <a:avLst/>
-          </a:prstGeom>
-          <a:noFill/>
-        </p:spPr>
-        <p:txBody>
-          <a:bodyPr wrap="none" rtlCol="0">
-            <a:spAutoFit/>
-          </a:bodyPr>
-          <a:lstStyle/>
-          <a:p>
-            <a:r>
-              <a:rPr lang="en-GB" dirty="0"/>
-              <a:t>Stochastic Threshold</a:t>
-            </a:r>
-          </a:p>
-        </p:txBody>
-      </p:sp>
-      <p:sp>
-        <p:nvSpPr>
-          <p:cNvPr id="12" name="TextBox 11"/>
-          <p:cNvSpPr txBox="1"/>
-          <p:nvPr/>
-        </p:nvSpPr>
-        <p:spPr>
-          <a:xfrm>
-            <a:off x="8367713" y="2105025"/>
-            <a:ext cx="3228975" cy="1477328"/>
-          </a:xfrm>
-          <a:prstGeom prst="rect">
-            <a:avLst/>
-          </a:prstGeom>
-          <a:noFill/>
-        </p:spPr>
-        <p:txBody>
-          <a:bodyPr wrap="square" rtlCol="0">
-            <a:spAutoFit/>
-          </a:bodyPr>
-          <a:lstStyle/>
-          <a:p>
-            <a:r>
-              <a:rPr lang="en-GB" dirty="0"/>
-              <a:t>- Indirect control of the probability to trigger a saccade</a:t>
-            </a:r>
-          </a:p>
-          <a:p>
-            <a:r>
-              <a:rPr lang="en-GB" dirty="0"/>
-              <a:t>- Noise is part of the mutual excitation/inhibition interactions</a:t>
-            </a:r>
-          </a:p>
-          <a:p>
-            <a:endParaRPr lang="en-GB" dirty="0"/>
-          </a:p>
-        </p:txBody>
-      </p:sp>
-      <p:sp>
-        <p:nvSpPr>
-          <p:cNvPr id="13" name="TextBox 12"/>
-          <p:cNvSpPr txBox="1"/>
-          <p:nvPr/>
-        </p:nvSpPr>
-        <p:spPr>
-          <a:xfrm>
-            <a:off x="8367712" y="4638675"/>
-            <a:ext cx="3228975" cy="2585323"/>
-          </a:xfrm>
-          <a:prstGeom prst="rect">
-            <a:avLst/>
-          </a:prstGeom>
-          <a:noFill/>
-        </p:spPr>
-        <p:txBody>
-          <a:bodyPr wrap="square" rtlCol="0">
-            <a:spAutoFit/>
-          </a:bodyPr>
-          <a:lstStyle/>
-          <a:p>
-            <a:r>
-              <a:rPr lang="en-GB" dirty="0"/>
-              <a:t>- Used as a general model of noise for fitting neuron models</a:t>
-            </a:r>
-          </a:p>
-          <a:p>
-            <a:r>
-              <a:rPr lang="en-GB" dirty="0"/>
-              <a:t>- Direct control of the probability to trigger a saccade</a:t>
-            </a:r>
-          </a:p>
-          <a:p>
-            <a:r>
-              <a:rPr lang="en-GB" dirty="0"/>
-              <a:t>- Noise is independent from stimulus interactions</a:t>
-            </a:r>
-          </a:p>
-          <a:p>
-            <a:endParaRPr lang="en-GB" dirty="0"/>
-          </a:p>
-          <a:p>
-            <a:endParaRPr lang="en-GB" dirty="0"/>
-          </a:p>
-          <a:p>
-            <a:endParaRPr lang="en-GB" dirty="0"/>
-          </a:p>
-        </p:txBody>
-      </p:sp>
     </p:spTree>
     <p:extLst>
       <p:ext uri="{BB962C8B-B14F-4D97-AF65-F5344CB8AC3E}">
-        <p14:creationId xmlns:p14="http://schemas.microsoft.com/office/powerpoint/2010/main" val="4230861319"/>
+        <p14:creationId xmlns:p14="http://schemas.microsoft.com/office/powerpoint/2010/main" val="3651046745"/>
       </p:ext>
     </p:extLst>
   </p:cSld>
@@ -5336,6 +5528,36 @@
           <a:chExt cx="0" cy="0"/>
         </a:xfrm>
       </p:grpSpPr>
+      <p:pic>
+        <p:nvPicPr>
+          <p:cNvPr id="4" name="Picture 3"/>
+          <p:cNvPicPr>
+            <a:picLocks noChangeAspect="1"/>
+          </p:cNvPicPr>
+          <p:nvPr/>
+        </p:nvPicPr>
+        <p:blipFill>
+          <a:blip r:embed="rId2">
+            <a:extLst>
+              <a:ext uri="{28A0092B-C50C-407E-A947-70E740481C1C}">
+                <a14:useLocalDpi xmlns:a14="http://schemas.microsoft.com/office/drawing/2010/main" val="0"/>
+              </a:ext>
+            </a:extLst>
+          </a:blip>
+          <a:stretch>
+            <a:fillRect/>
+          </a:stretch>
+        </p:blipFill>
+        <p:spPr>
+          <a:xfrm>
+            <a:off x="2031006" y="4386335"/>
+            <a:ext cx="6650432" cy="2076069"/>
+          </a:xfrm>
+          <a:prstGeom prst="rect">
+            <a:avLst/>
+          </a:prstGeom>
+        </p:spPr>
+      </p:pic>
       <p:sp>
         <p:nvSpPr>
           <p:cNvPr id="2" name="Title 1"/>
@@ -5358,16 +5580,46 @@
           </a:p>
         </p:txBody>
       </p:sp>
-      <p:sp>
-        <p:nvSpPr>
-          <p:cNvPr id="5" name="TextBox 4"/>
+      <p:pic>
+        <p:nvPicPr>
+          <p:cNvPr id="6" name="Picture 5"/>
+          <p:cNvPicPr>
+            <a:picLocks noChangeAspect="1"/>
+          </p:cNvPicPr>
+          <p:nvPr/>
+        </p:nvPicPr>
+        <p:blipFill>
+          <a:blip r:embed="rId3">
+            <a:extLst>
+              <a:ext uri="{28A0092B-C50C-407E-A947-70E740481C1C}">
+                <a14:useLocalDpi xmlns:a14="http://schemas.microsoft.com/office/drawing/2010/main" val="0"/>
+              </a:ext>
+            </a:extLst>
+          </a:blip>
+          <a:stretch>
+            <a:fillRect/>
+          </a:stretch>
+        </p:blipFill>
+        <p:spPr>
+          <a:xfrm>
+            <a:off x="2513698" y="2142237"/>
+            <a:ext cx="5581225" cy="1938096"/>
+          </a:xfrm>
+          <a:prstGeom prst="rect">
+            <a:avLst/>
+          </a:prstGeom>
+        </p:spPr>
+      </p:pic>
+      <p:sp>
+        <p:nvSpPr>
+          <p:cNvPr id="11" name="TextBox 10"/>
           <p:cNvSpPr txBox="1"/>
           <p:nvPr/>
         </p:nvSpPr>
         <p:spPr>
           <a:xfrm>
-            <a:off x="738018" y="1443546"/>
-            <a:ext cx="5223802" cy="1200329"/>
+            <a:off x="4244470" y="1785782"/>
+            <a:ext cx="2119683" cy="369332"/>
           </a:xfrm>
           <a:prstGeom prst="rect">
             <a:avLst/>
@@ -5382,23 +5634,197 @@
           <a:p>
             <a:r>
               <a:rPr lang="en-GB" dirty="0"/>
-              <a:t>In DINASAUR, small saccades were:</a:t>
-            </a:r>
-          </a:p>
-          <a:p>
-            <a:pPr marL="285750" indent="-285750">
-              <a:buFontTx/>
-              <a:buChar char="-"/>
-            </a:pPr>
+              <a:t>Stochastic Threshold</a:t>
+            </a:r>
+          </a:p>
+        </p:txBody>
+      </p:sp>
+      <p:sp>
+        <p:nvSpPr>
+          <p:cNvPr id="13" name="TextBox 12"/>
+          <p:cNvSpPr txBox="1"/>
+          <p:nvPr/>
+        </p:nvSpPr>
+        <p:spPr>
+          <a:xfrm>
+            <a:off x="8367712" y="2281230"/>
+            <a:ext cx="3228975" cy="4801314"/>
+          </a:xfrm>
+          <a:prstGeom prst="rect">
+            <a:avLst/>
+          </a:prstGeom>
+          <a:noFill/>
+        </p:spPr>
+        <p:txBody>
+          <a:bodyPr wrap="square" rtlCol="0">
+            <a:spAutoFit/>
+          </a:bodyPr>
+          <a:lstStyle/>
+          <a:p>
+            <a:r>
+              <a:rPr lang="en-GB" dirty="0"/>
+              <a:t>- Used as a general model of noise for fitting neuron models</a:t>
+            </a:r>
+          </a:p>
+          <a:p>
+            <a:endParaRPr lang="en-GB" dirty="0"/>
+          </a:p>
+          <a:p>
+            <a:r>
+              <a:rPr lang="en-GB" dirty="0"/>
+              <a:t>- Direct control of the probability to trigger a saccade</a:t>
+            </a:r>
+          </a:p>
+          <a:p>
+            <a:endParaRPr lang="en-GB" dirty="0"/>
+          </a:p>
+          <a:p>
+            <a:endParaRPr lang="en-GB" dirty="0"/>
+          </a:p>
+          <a:p>
+            <a:endParaRPr lang="en-GB" dirty="0"/>
+          </a:p>
+          <a:p>
+            <a:endParaRPr lang="en-GB" dirty="0"/>
+          </a:p>
+          <a:p>
+            <a:endParaRPr lang="en-GB" dirty="0"/>
+          </a:p>
+          <a:p>
+            <a:r>
+              <a:rPr lang="en-GB" dirty="0"/>
+              <a:t>- Noise is independent from stimulus interactions</a:t>
+            </a:r>
+          </a:p>
+          <a:p>
+            <a:r>
+              <a:rPr lang="en-GB" dirty="0">
+                <a:solidFill>
+                  <a:schemeClr val="bg2">
+                    <a:lumMod val="50000"/>
+                  </a:schemeClr>
+                </a:solidFill>
+              </a:rPr>
+              <a:t>(note the small effect of Distractor)</a:t>
+            </a:r>
+          </a:p>
+          <a:p>
+            <a:endParaRPr lang="en-GB" dirty="0"/>
+          </a:p>
+          <a:p>
+            <a:endParaRPr lang="en-GB" dirty="0"/>
+          </a:p>
+          <a:p>
+            <a:endParaRPr lang="en-GB" dirty="0"/>
+          </a:p>
+        </p:txBody>
+      </p:sp>
+      <p:sp>
+        <p:nvSpPr>
+          <p:cNvPr id="14" name="TextBox 13"/>
+          <p:cNvSpPr txBox="1"/>
+          <p:nvPr/>
+        </p:nvSpPr>
+        <p:spPr>
+          <a:xfrm>
+            <a:off x="785643" y="1409317"/>
+            <a:ext cx="2856167" cy="369332"/>
+          </a:xfrm>
+          <a:prstGeom prst="rect">
+            <a:avLst/>
+          </a:prstGeom>
+          <a:noFill/>
+        </p:spPr>
+        <p:txBody>
+          <a:bodyPr wrap="none" rtlCol="0">
+            <a:spAutoFit/>
+          </a:bodyPr>
+          <a:lstStyle/>
+          <a:p>
             <a:r>
               <a:rPr lang="en-GB" dirty="0">
                 <a:solidFill>
                   <a:schemeClr val="accent1"/>
                 </a:solidFill>
               </a:rPr>
-              <a:t>Too many</a:t>
-            </a:r>
-          </a:p>
+              <a:t>- not well distributed in time</a:t>
+            </a:r>
+          </a:p>
+        </p:txBody>
+      </p:sp>
+    </p:spTree>
+    <p:extLst>
+      <p:ext uri="{BB962C8B-B14F-4D97-AF65-F5344CB8AC3E}">
+        <p14:creationId xmlns:p14="http://schemas.microsoft.com/office/powerpoint/2010/main" val="3277129526"/>
+      </p:ext>
+    </p:extLst>
+  </p:cSld>
+  <p:clrMapOvr>
+    <a:masterClrMapping/>
+  </p:clrMapOvr>
+</p:sld>
+</file>
+
+<file path=ppt/slides/slide18.xml><?xml version="1.0" encoding="utf-8"?>
+<p:sld xmlns:a="http://schemas.openxmlformats.org/drawingml/2006/main" xmlns:r="http://schemas.openxmlformats.org/officeDocument/2006/relationships" xmlns:p="http://schemas.openxmlformats.org/presentationml/2006/main">
+  <p:cSld>
+    <p:spTree>
+      <p:nvGrpSpPr>
+        <p:cNvPr id="1" name=""/>
+        <p:cNvGrpSpPr/>
+        <p:nvPr/>
+      </p:nvGrpSpPr>
+      <p:grpSpPr>
+        <a:xfrm>
+          <a:off x="0" y="0"/>
+          <a:ext cx="0" cy="0"/>
+          <a:chOff x="0" y="0"/>
+          <a:chExt cx="0" cy="0"/>
+        </a:xfrm>
+      </p:grpSpPr>
+      <p:sp>
+        <p:nvSpPr>
+          <p:cNvPr id="2" name="Title 1"/>
+          <p:cNvSpPr>
+            <a:spLocks noGrp="1"/>
+          </p:cNvSpPr>
+          <p:nvPr>
+            <p:ph type="title"/>
+          </p:nvPr>
+        </p:nvSpPr>
+        <p:spPr/>
+        <p:txBody>
+          <a:bodyPr/>
+          <a:lstStyle/>
+          <a:p>
+            <a:r>
+              <a:rPr lang="en-GB" dirty="0"/>
+              <a:t>Unifying micro and macro-saccade</a:t>
+            </a:r>
+          </a:p>
+        </p:txBody>
+      </p:sp>
+      <p:sp>
+        <p:nvSpPr>
+          <p:cNvPr id="5" name="TextBox 4"/>
+          <p:cNvSpPr txBox="1"/>
+          <p:nvPr/>
+        </p:nvSpPr>
+        <p:spPr>
+          <a:xfrm>
+            <a:off x="738018" y="1443546"/>
+            <a:ext cx="3127075" cy="646331"/>
+          </a:xfrm>
+          <a:prstGeom prst="rect">
+            <a:avLst/>
+          </a:prstGeom>
+          <a:noFill/>
+        </p:spPr>
+        <p:txBody>
+          <a:bodyPr wrap="none" rtlCol="0">
+            <a:spAutoFit/>
+          </a:bodyPr>
+          <a:lstStyle/>
           <a:p>
             <a:pPr marL="285750" indent="-285750">
               <a:buFontTx/>
@@ -5410,7 +5836,7 @@
                   <a:schemeClr val="accent1"/>
                 </a:solidFill>
               </a:rPr>
-              <a:t>Not small enough</a:t>
+              <a:t>not well distributed in time </a:t>
             </a:r>
           </a:p>
           <a:p>
@@ -5419,9 +5845,18 @@
               <a:buChar char="-"/>
             </a:pPr>
             <a:r>
-              <a:rPr lang="en-GB" dirty="0"/>
-              <a:t>The only saccade generated (one saccade per trial)</a:t>
-            </a:r>
+              <a:rPr lang="en-GB" dirty="0">
+                <a:solidFill>
+                  <a:schemeClr val="accent1"/>
+                </a:solidFill>
+              </a:rPr>
+              <a:t>not well distributed in space</a:t>
+            </a:r>
+            <a:endParaRPr lang="en-GB" dirty="0">
+              <a:solidFill>
+                <a:schemeClr val="accent1"/>
+              </a:solidFill>
+            </a:endParaRPr>
           </a:p>
         </p:txBody>
       </p:sp>
@@ -5588,6 +6023,108 @@
     <p:extLst>
       <p:ext uri="{BB962C8B-B14F-4D97-AF65-F5344CB8AC3E}">
         <p14:creationId xmlns:p14="http://schemas.microsoft.com/office/powerpoint/2010/main" val="2364743787"/>
+      </p:ext>
+    </p:extLst>
+  </p:cSld>
+  <p:clrMapOvr>
+    <a:masterClrMapping/>
+  </p:clrMapOvr>
+</p:sld>
+</file>
+
+<file path=ppt/slides/slide19.xml><?xml version="1.0" encoding="utf-8"?>
+<p:sld xmlns:a="http://schemas.openxmlformats.org/drawingml/2006/main" xmlns:r="http://schemas.openxmlformats.org/officeDocument/2006/relationships" xmlns:p="http://schemas.openxmlformats.org/presentationml/2006/main">
+  <p:cSld>
+    <p:spTree>
+      <p:nvGrpSpPr>
+        <p:cNvPr id="1" name=""/>
+        <p:cNvGrpSpPr/>
+        <p:nvPr/>
+      </p:nvGrpSpPr>
+      <p:grpSpPr>
+        <a:xfrm>
+          <a:off x="0" y="0"/>
+          <a:ext cx="0" cy="0"/>
+          <a:chOff x="0" y="0"/>
+          <a:chExt cx="0" cy="0"/>
+        </a:xfrm>
+      </p:grpSpPr>
+      <p:sp>
+        <p:nvSpPr>
+          <p:cNvPr id="2" name="Title 1"/>
+          <p:cNvSpPr>
+            <a:spLocks noGrp="1"/>
+          </p:cNvSpPr>
+          <p:nvPr>
+            <p:ph type="title"/>
+          </p:nvPr>
+        </p:nvSpPr>
+        <p:spPr/>
+        <p:txBody>
+          <a:bodyPr/>
+          <a:lstStyle/>
+          <a:p>
+            <a:r>
+              <a:rPr lang="en-GB" dirty="0"/>
+              <a:t>Unifying micro and macro-saccade</a:t>
+            </a:r>
+          </a:p>
+        </p:txBody>
+      </p:sp>
+      <p:sp>
+        <p:nvSpPr>
+          <p:cNvPr id="5" name="TextBox 4"/>
+          <p:cNvSpPr txBox="1"/>
+          <p:nvPr/>
+        </p:nvSpPr>
+        <p:spPr>
+          <a:xfrm>
+            <a:off x="738018" y="1443546"/>
+            <a:ext cx="9054466" cy="369332"/>
+          </a:xfrm>
+          <a:prstGeom prst="rect">
+            <a:avLst/>
+          </a:prstGeom>
+          <a:noFill/>
+        </p:spPr>
+        <p:txBody>
+          <a:bodyPr wrap="none" rtlCol="0">
+            <a:spAutoFit/>
+          </a:bodyPr>
+          <a:lstStyle/>
+          <a:p>
+            <a:pPr marL="285750" indent="-285750">
+              <a:buFontTx/>
+              <a:buChar char="-"/>
+            </a:pPr>
+            <a:r>
+              <a:rPr lang="en-GB" dirty="0">
+                <a:solidFill>
+                  <a:schemeClr val="accent1"/>
+                </a:solidFill>
+              </a:rPr>
+              <a:t>Distribution in space </a:t>
+            </a:r>
+            <a:r>
+              <a:rPr lang="en-GB" dirty="0">
+                <a:solidFill>
+                  <a:schemeClr val="accent2"/>
+                </a:solidFill>
+              </a:rPr>
+              <a:t>(Caution! We’re using the stochastic threshold for simpler simulations)</a:t>
+            </a:r>
+            <a:endParaRPr lang="en-GB" dirty="0">
+              <a:solidFill>
+                <a:schemeClr val="accent2"/>
+              </a:solidFill>
+            </a:endParaRPr>
+          </a:p>
+        </p:txBody>
+      </p:sp>
+    </p:spTree>
+    <p:extLst>
+      <p:ext uri="{BB962C8B-B14F-4D97-AF65-F5344CB8AC3E}">
+        <p14:creationId xmlns:p14="http://schemas.microsoft.com/office/powerpoint/2010/main" val="1186617437"/>
       </p:ext>
     </p:extLst>
   </p:cSld>
@@ -6628,6 +7165,71 @@
           </a:fontRef>
         </p:style>
       </p:cxnSp>
+      <p:cxnSp>
+        <p:nvCxnSpPr>
+          <p:cNvPr id="13" name="Straight Arrow Connector 12"/>
+          <p:cNvCxnSpPr/>
+          <p:nvPr/>
+        </p:nvCxnSpPr>
+        <p:spPr>
+          <a:xfrm>
+            <a:off x="1103152" y="6551807"/>
+            <a:ext cx="9605395" cy="0"/>
+          </a:xfrm>
+          <a:prstGeom prst="straightConnector1">
+            <a:avLst/>
+          </a:prstGeom>
+          <a:ln w="28575">
+            <a:solidFill>
+              <a:schemeClr val="tx1"/>
+            </a:solidFill>
+            <a:tailEnd type="triangle"/>
+          </a:ln>
+        </p:spPr>
+        <p:style>
+          <a:lnRef idx="1">
+            <a:schemeClr val="accent1"/>
+          </a:lnRef>
+          <a:fillRef idx="0">
+            <a:schemeClr val="accent1"/>
+          </a:fillRef>
+          <a:effectRef idx="0">
+            <a:schemeClr val="accent1"/>
+          </a:effectRef>
+          <a:fontRef idx="minor">
+            <a:schemeClr val="tx1"/>
+          </a:fontRef>
+        </p:style>
+      </p:cxnSp>
+      <p:sp>
+        <p:nvSpPr>
+          <p:cNvPr id="15" name="TextBox 14"/>
+          <p:cNvSpPr txBox="1"/>
+          <p:nvPr/>
+        </p:nvSpPr>
+        <p:spPr>
+          <a:xfrm>
+            <a:off x="5253476" y="6493084"/>
+            <a:ext cx="614271" cy="369332"/>
+          </a:xfrm>
+          <a:prstGeom prst="rect">
+            <a:avLst/>
+          </a:prstGeom>
+          <a:noFill/>
+        </p:spPr>
+        <p:txBody>
+          <a:bodyPr wrap="none" rtlCol="0">
+            <a:spAutoFit/>
+          </a:bodyPr>
+          <a:lstStyle/>
+          <a:p>
+            <a:r>
+              <a:rPr lang="en-GB" dirty="0"/>
+              <a:t>time</a:t>
+            </a:r>
+          </a:p>
+        </p:txBody>
+      </p:sp>
     </p:spTree>
     <p:extLst>
       <p:ext uri="{BB962C8B-B14F-4D97-AF65-F5344CB8AC3E}">
@@ -6779,7 +7381,23 @@
         </p:nvPicPr>
         <p:blipFill>
           <a:blip r:embed="rId4">
+            <a:duotone>
+              <a:prstClr val="black"/>
+              <a:schemeClr val="accent1">
+                <a:tint val="45000"/>
+                <a:satMod val="400000"/>
+              </a:schemeClr>
+            </a:duotone>
             <a:extLst>
+              <a:ext uri="{BEBA8EAE-BF5A-486C-A8C5-ECC9F3942E4B}">
+                <a14:imgProps xmlns:a14="http://schemas.microsoft.com/office/drawing/2010/main">
+                  <a14:imgLayer r:embed="rId5">
+                    <a14:imgEffect>
+                      <a14:colorTemperature colorTemp="9576"/>
+                    </a14:imgEffect>
+                  </a14:imgLayer>
+                </a14:imgProps>
+              </a:ext>
               <a:ext uri="{28A0092B-C50C-407E-A947-70E740481C1C}">
                 <a14:useLocalDpi xmlns:a14="http://schemas.microsoft.com/office/drawing/2010/main" val="0"/>
               </a:ext>
@@ -6808,7 +7426,7 @@
           <p:nvPr/>
         </p:nvPicPr>
         <p:blipFill>
-          <a:blip r:embed="rId5">
+          <a:blip r:embed="rId6">
             <a:extLst>
               <a:ext uri="{28A0092B-C50C-407E-A947-70E740481C1C}">
                 <a14:useLocalDpi xmlns:a14="http://schemas.microsoft.com/office/drawing/2010/main" val="0"/>
@@ -6930,6 +7548,114 @@
           </a:fontRef>
         </p:style>
       </p:cxnSp>
+      <p:cxnSp>
+        <p:nvCxnSpPr>
+          <p:cNvPr id="15" name="Straight Arrow Connector 14"/>
+          <p:cNvCxnSpPr/>
+          <p:nvPr/>
+        </p:nvCxnSpPr>
+        <p:spPr>
+          <a:xfrm>
+            <a:off x="1103152" y="6551807"/>
+            <a:ext cx="9605395" cy="0"/>
+          </a:xfrm>
+          <a:prstGeom prst="straightConnector1">
+            <a:avLst/>
+          </a:prstGeom>
+          <a:ln w="28575">
+            <a:solidFill>
+              <a:schemeClr val="tx1"/>
+            </a:solidFill>
+            <a:tailEnd type="triangle"/>
+          </a:ln>
+        </p:spPr>
+        <p:style>
+          <a:lnRef idx="1">
+            <a:schemeClr val="accent1"/>
+          </a:lnRef>
+          <a:fillRef idx="0">
+            <a:schemeClr val="accent1"/>
+          </a:fillRef>
+          <a:effectRef idx="0">
+            <a:schemeClr val="accent1"/>
+          </a:effectRef>
+          <a:fontRef idx="minor">
+            <a:schemeClr val="tx1"/>
+          </a:fontRef>
+        </p:style>
+      </p:cxnSp>
+      <p:sp>
+        <p:nvSpPr>
+          <p:cNvPr id="17" name="TextBox 16"/>
+          <p:cNvSpPr txBox="1"/>
+          <p:nvPr/>
+        </p:nvSpPr>
+        <p:spPr>
+          <a:xfrm>
+            <a:off x="5253476" y="6493084"/>
+            <a:ext cx="614271" cy="369332"/>
+          </a:xfrm>
+          <a:prstGeom prst="rect">
+            <a:avLst/>
+          </a:prstGeom>
+          <a:noFill/>
+        </p:spPr>
+        <p:txBody>
+          <a:bodyPr wrap="none" rtlCol="0">
+            <a:spAutoFit/>
+          </a:bodyPr>
+          <a:lstStyle/>
+          <a:p>
+            <a:r>
+              <a:rPr lang="en-GB" dirty="0"/>
+              <a:t>time</a:t>
+            </a:r>
+          </a:p>
+        </p:txBody>
+      </p:sp>
+      <p:sp>
+        <p:nvSpPr>
+          <p:cNvPr id="6" name="Arrow: Right 5"/>
+          <p:cNvSpPr/>
+          <p:nvPr/>
+        </p:nvSpPr>
+        <p:spPr>
+          <a:xfrm rot="5400000">
+            <a:off x="7962201" y="3916389"/>
+            <a:ext cx="2365696" cy="1602298"/>
+          </a:xfrm>
+          <a:prstGeom prst="rightArrow">
+            <a:avLst/>
+          </a:prstGeom>
+        </p:spPr>
+        <p:style>
+          <a:lnRef idx="2">
+            <a:schemeClr val="accent1">
+              <a:shade val="50000"/>
+            </a:schemeClr>
+          </a:lnRef>
+          <a:fillRef idx="1">
+            <a:schemeClr val="accent1"/>
+          </a:fillRef>
+          <a:effectRef idx="0">
+            <a:schemeClr val="accent1"/>
+          </a:effectRef>
+          <a:fontRef idx="minor">
+            <a:schemeClr val="lt1"/>
+          </a:fontRef>
+        </p:style>
+        <p:txBody>
+          <a:bodyPr rtlCol="0" anchor="ctr"/>
+          <a:lstStyle/>
+          <a:p>
+            <a:pPr algn="ctr"/>
+            <a:r>
+              <a:rPr lang="en-GB" dirty="0"/>
+              <a:t>TOP DOWN </a:t>
+            </a:r>
+          </a:p>
+        </p:txBody>
+      </p:sp>
     </p:spTree>
     <p:extLst>
       <p:ext uri="{BB962C8B-B14F-4D97-AF65-F5344CB8AC3E}">
@@ -7331,6 +8057,71 @@
           </a:prstGeom>
         </p:spPr>
       </p:pic>
+      <p:cxnSp>
+        <p:nvCxnSpPr>
+          <p:cNvPr id="5" name="Straight Arrow Connector 4"/>
+          <p:cNvCxnSpPr/>
+          <p:nvPr/>
+        </p:nvCxnSpPr>
+        <p:spPr>
+          <a:xfrm>
+            <a:off x="1103152" y="6551807"/>
+            <a:ext cx="9605395" cy="0"/>
+          </a:xfrm>
+          <a:prstGeom prst="straightConnector1">
+            <a:avLst/>
+          </a:prstGeom>
+          <a:ln w="28575">
+            <a:solidFill>
+              <a:schemeClr val="tx1"/>
+            </a:solidFill>
+            <a:tailEnd type="triangle"/>
+          </a:ln>
+        </p:spPr>
+        <p:style>
+          <a:lnRef idx="1">
+            <a:schemeClr val="accent1"/>
+          </a:lnRef>
+          <a:fillRef idx="0">
+            <a:schemeClr val="accent1"/>
+          </a:fillRef>
+          <a:effectRef idx="0">
+            <a:schemeClr val="accent1"/>
+          </a:effectRef>
+          <a:fontRef idx="minor">
+            <a:schemeClr val="tx1"/>
+          </a:fontRef>
+        </p:style>
+      </p:cxnSp>
+      <p:sp>
+        <p:nvSpPr>
+          <p:cNvPr id="6" name="TextBox 5"/>
+          <p:cNvSpPr txBox="1"/>
+          <p:nvPr/>
+        </p:nvSpPr>
+        <p:spPr>
+          <a:xfrm>
+            <a:off x="5253476" y="6493084"/>
+            <a:ext cx="614271" cy="369332"/>
+          </a:xfrm>
+          <a:prstGeom prst="rect">
+            <a:avLst/>
+          </a:prstGeom>
+          <a:noFill/>
+        </p:spPr>
+        <p:txBody>
+          <a:bodyPr wrap="none" rtlCol="0">
+            <a:spAutoFit/>
+          </a:bodyPr>
+          <a:lstStyle/>
+          <a:p>
+            <a:r>
+              <a:rPr lang="en-GB" dirty="0"/>
+              <a:t>time</a:t>
+            </a:r>
+          </a:p>
+        </p:txBody>
+      </p:sp>
     </p:spTree>
     <p:extLst>
       <p:ext uri="{BB962C8B-B14F-4D97-AF65-F5344CB8AC3E}">
@@ -7502,61 +8293,6 @@
           </a:prstGeom>
         </p:spPr>
       </p:pic>
-      <p:sp>
-        <p:nvSpPr>
-          <p:cNvPr id="3" name="TextBox 2"/>
-          <p:cNvSpPr txBox="1"/>
-          <p:nvPr/>
-        </p:nvSpPr>
-        <p:spPr>
-          <a:xfrm>
-            <a:off x="3028950" y="2152650"/>
-            <a:ext cx="5293309" cy="1200329"/>
-          </a:xfrm>
-          <a:prstGeom prst="rect">
-            <a:avLst/>
-          </a:prstGeom>
-          <a:noFill/>
-        </p:spPr>
-        <p:txBody>
-          <a:bodyPr wrap="none" rtlCol="0">
-            <a:spAutoFit/>
-          </a:bodyPr>
-          <a:lstStyle/>
-          <a:p>
-            <a:r>
-              <a:rPr lang="en-GB" dirty="0"/>
-              <a:t>OK, that is good, but …</a:t>
-            </a:r>
-          </a:p>
-          <a:p>
-            <a:r>
-              <a:rPr lang="en-GB" dirty="0"/>
-              <a:t>DINASAUR is made to:</a:t>
-            </a:r>
-          </a:p>
-          <a:p>
-            <a:pPr marL="285750" indent="-285750">
-              <a:buFontTx/>
-              <a:buChar char="-"/>
-            </a:pPr>
-            <a:r>
-              <a:rPr lang="en-GB" dirty="0"/>
-              <a:t>trigger a saccade whenever the threshold in passed</a:t>
-            </a:r>
-          </a:p>
-          <a:p>
-            <a:pPr marL="285750" indent="-285750">
-              <a:buFontTx/>
-              <a:buChar char="-"/>
-            </a:pPr>
-            <a:r>
-              <a:rPr lang="en-GB" dirty="0"/>
-              <a:t>trigger only one saccade per trial</a:t>
-            </a:r>
-          </a:p>
-        </p:txBody>
-      </p:sp>
       <p:sp>
         <p:nvSpPr>
           <p:cNvPr id="23" name="TextBox 22"/>

</xml_diff>